<commit_message>
Version V1001 overworked audio control, backup recorder included
</commit_message>
<xml_diff>
--- a/docu/JoKiAutomationTemplate.pptx
+++ b/docu/JoKiAutomationTemplate.pptx
@@ -12,13 +12,11 @@
     <p:sldId id="262" r:id="rId6"/>
     <p:sldId id="264" r:id="rId7"/>
     <p:sldId id="263" r:id="rId8"/>
-    <p:sldId id="265" r:id="rId9"/>
-    <p:sldId id="266" r:id="rId10"/>
-    <p:sldId id="267" r:id="rId11"/>
-    <p:sldId id="269" r:id="rId12"/>
-    <p:sldId id="271" r:id="rId13"/>
-    <p:sldId id="270" r:id="rId14"/>
-    <p:sldId id="272" r:id="rId15"/>
+    <p:sldId id="269" r:id="rId9"/>
+    <p:sldId id="271" r:id="rId10"/>
+    <p:sldId id="270" r:id="rId11"/>
+    <p:sldId id="273" r:id="rId12"/>
+    <p:sldId id="272" r:id="rId13"/>
   </p:sldIdLst>
   <p:sldSz cx="12192000" cy="6858000"/>
   <p:notesSz cx="6858000" cy="9144000"/>
@@ -268,7 +266,7 @@
             <a:fld id="{601D6D48-1CD0-4D69-8E45-8FD8C1E00D98}" type="datetimeFigureOut">
               <a:rPr lang="de-DE" smtClean="0"/>
               <a:pPr/>
-              <a:t>04.12.2020</a:t>
+              <a:t>15.12.2020</a:t>
             </a:fld>
             <a:endParaRPr lang="de-DE"/>
           </a:p>
@@ -440,7 +438,7 @@
             <a:fld id="{601D6D48-1CD0-4D69-8E45-8FD8C1E00D98}" type="datetimeFigureOut">
               <a:rPr lang="de-DE" smtClean="0"/>
               <a:pPr/>
-              <a:t>04.12.2020</a:t>
+              <a:t>15.12.2020</a:t>
             </a:fld>
             <a:endParaRPr lang="de-DE"/>
           </a:p>
@@ -622,7 +620,7 @@
             <a:fld id="{601D6D48-1CD0-4D69-8E45-8FD8C1E00D98}" type="datetimeFigureOut">
               <a:rPr lang="de-DE" smtClean="0"/>
               <a:pPr/>
-              <a:t>04.12.2020</a:t>
+              <a:t>15.12.2020</a:t>
             </a:fld>
             <a:endParaRPr lang="de-DE"/>
           </a:p>
@@ -794,7 +792,7 @@
             <a:fld id="{601D6D48-1CD0-4D69-8E45-8FD8C1E00D98}" type="datetimeFigureOut">
               <a:rPr lang="de-DE" smtClean="0"/>
               <a:pPr/>
-              <a:t>04.12.2020</a:t>
+              <a:t>15.12.2020</a:t>
             </a:fld>
             <a:endParaRPr lang="de-DE"/>
           </a:p>
@@ -1042,7 +1040,7 @@
             <a:fld id="{601D6D48-1CD0-4D69-8E45-8FD8C1E00D98}" type="datetimeFigureOut">
               <a:rPr lang="de-DE" smtClean="0"/>
               <a:pPr/>
-              <a:t>04.12.2020</a:t>
+              <a:t>15.12.2020</a:t>
             </a:fld>
             <a:endParaRPr lang="de-DE"/>
           </a:p>
@@ -1276,7 +1274,7 @@
             <a:fld id="{601D6D48-1CD0-4D69-8E45-8FD8C1E00D98}" type="datetimeFigureOut">
               <a:rPr lang="de-DE" smtClean="0"/>
               <a:pPr/>
-              <a:t>04.12.2020</a:t>
+              <a:t>15.12.2020</a:t>
             </a:fld>
             <a:endParaRPr lang="de-DE"/>
           </a:p>
@@ -1645,7 +1643,7 @@
             <a:fld id="{601D6D48-1CD0-4D69-8E45-8FD8C1E00D98}" type="datetimeFigureOut">
               <a:rPr lang="de-DE" smtClean="0"/>
               <a:pPr/>
-              <a:t>04.12.2020</a:t>
+              <a:t>15.12.2020</a:t>
             </a:fld>
             <a:endParaRPr lang="de-DE"/>
           </a:p>
@@ -1765,7 +1763,7 @@
             <a:fld id="{601D6D48-1CD0-4D69-8E45-8FD8C1E00D98}" type="datetimeFigureOut">
               <a:rPr lang="de-DE" smtClean="0"/>
               <a:pPr/>
-              <a:t>04.12.2020</a:t>
+              <a:t>15.12.2020</a:t>
             </a:fld>
             <a:endParaRPr lang="de-DE"/>
           </a:p>
@@ -1862,7 +1860,7 @@
             <a:fld id="{601D6D48-1CD0-4D69-8E45-8FD8C1E00D98}" type="datetimeFigureOut">
               <a:rPr lang="de-DE" smtClean="0"/>
               <a:pPr/>
-              <a:t>04.12.2020</a:t>
+              <a:t>15.12.2020</a:t>
             </a:fld>
             <a:endParaRPr lang="de-DE"/>
           </a:p>
@@ -2141,7 +2139,7 @@
             <a:fld id="{601D6D48-1CD0-4D69-8E45-8FD8C1E00D98}" type="datetimeFigureOut">
               <a:rPr lang="de-DE" smtClean="0"/>
               <a:pPr/>
-              <a:t>04.12.2020</a:t>
+              <a:t>15.12.2020</a:t>
             </a:fld>
             <a:endParaRPr lang="de-DE"/>
           </a:p>
@@ -2400,7 +2398,7 @@
             <a:fld id="{601D6D48-1CD0-4D69-8E45-8FD8C1E00D98}" type="datetimeFigureOut">
               <a:rPr lang="de-DE" smtClean="0"/>
               <a:pPr/>
-              <a:t>04.12.2020</a:t>
+              <a:t>15.12.2020</a:t>
             </a:fld>
             <a:endParaRPr lang="de-DE"/>
           </a:p>
@@ -2615,7 +2613,7 @@
             <a:fld id="{601D6D48-1CD0-4D69-8E45-8FD8C1E00D98}" type="datetimeFigureOut">
               <a:rPr lang="de-DE" smtClean="0"/>
               <a:pPr/>
-              <a:t>04.12.2020</a:t>
+              <a:t>15.12.2020</a:t>
             </a:fld>
             <a:endParaRPr lang="de-DE"/>
           </a:p>
@@ -3077,7 +3075,7 @@
         </p:spPr>
         <p:txBody>
           <a:bodyPr>
-            <a:normAutofit fontScale="85000" lnSpcReduction="20000"/>
+            <a:normAutofit fontScale="92500" lnSpcReduction="20000"/>
           </a:bodyPr>
           <a:lstStyle/>
           <a:p>
@@ -3100,27 +3098,8 @@
           </a:p>
           <a:p>
             <a:r>
-              <a:rPr lang="de-DE" dirty="0" err="1"/>
-              <a:t>Audiochannel</a:t>
-            </a:r>
-            <a:r>
-              <a:rPr lang="de-DE" dirty="0"/>
-              <a:t> 1 fade </a:t>
-            </a:r>
-            <a:r>
-              <a:rPr lang="de-DE" dirty="0" err="1"/>
-              <a:t>up</a:t>
-            </a:r>
-            <a:endParaRPr lang="de-DE" dirty="0"/>
-          </a:p>
-          <a:p>
-            <a:r>
-              <a:rPr lang="de-DE" dirty="0" err="1"/>
-              <a:t>Audiochannel</a:t>
-            </a:r>
-            <a:r>
-              <a:rPr lang="de-DE" dirty="0"/>
-              <a:t> 2,3,4 fade down</a:t>
+              <a:rPr lang="de-DE" dirty="0"/>
+              <a:t>Audio Mix Profile ‚Diashow‘</a:t>
             </a:r>
           </a:p>
           <a:p>
@@ -3135,6 +3114,12 @@
             <a:r>
               <a:rPr lang="de-DE" dirty="0"/>
               <a:t> 1 (Laptop PPP)</a:t>
+            </a:r>
+          </a:p>
+          <a:p>
+            <a:r>
+              <a:rPr lang="de-DE" dirty="0"/>
+              <a:t>Start Backup Recorder</a:t>
             </a:r>
           </a:p>
           <a:p>
@@ -3215,19 +3200,7 @@
                   <a:srgbClr val="FF0000"/>
                 </a:solidFill>
               </a:rPr>
-              <a:t>1 B1</a:t>
-            </a:r>
-            <a:r>
-              <a:rPr lang="de-DE" dirty="0"/>
-              <a:t> </a:t>
-            </a:r>
-            <a:r>
-              <a:rPr lang="de-DE" dirty="0">
-                <a:solidFill>
-                  <a:srgbClr val="FF0000"/>
-                </a:solidFill>
-              </a:rPr>
-              <a:t>A1</a:t>
+              <a:t>T</a:t>
             </a:r>
             <a:r>
               <a:rPr lang="de-DE" dirty="0"/>
@@ -3361,32 +3334,12 @@
           <a:lstStyle/>
           <a:p>
             <a:r>
-              <a:rPr lang="de-DE" dirty="0"/>
-              <a:t>Audio </a:t>
-            </a:r>
-            <a:r>
-              <a:rPr lang="de-DE" dirty="0" err="1"/>
-              <a:t>channel</a:t>
-            </a:r>
-            <a:r>
-              <a:rPr lang="de-DE" dirty="0"/>
-              <a:t> 4  (</a:t>
-            </a:r>
-            <a:r>
-              <a:rPr lang="de-DE" dirty="0" err="1"/>
-              <a:t>channel</a:t>
-            </a:r>
-            <a:r>
-              <a:rPr lang="de-DE" dirty="0"/>
-              <a:t> 4 </a:t>
-            </a:r>
-            <a:r>
-              <a:rPr lang="de-DE" dirty="0" err="1"/>
-              <a:t>audiomix</a:t>
-            </a:r>
-            <a:r>
-              <a:rPr lang="de-DE" dirty="0"/>
-              <a:t>)</a:t>
+              <a:rPr lang="de-DE" dirty="0" err="1"/>
+              <a:t>Beamer</a:t>
+            </a:r>
+            <a:r>
+              <a:rPr lang="de-DE" dirty="0"/>
+              <a:t> Videoclip Text 1  Text 2</a:t>
             </a:r>
           </a:p>
         </p:txBody>
@@ -3414,38 +3367,50 @@
           </a:xfrm>
         </p:spPr>
         <p:txBody>
-          <a:bodyPr/>
-          <a:lstStyle/>
-          <a:p>
-            <a:r>
-              <a:rPr lang="de-DE" dirty="0" err="1"/>
-              <a:t>Audiochannel</a:t>
-            </a:r>
-            <a:r>
-              <a:rPr lang="de-DE" dirty="0"/>
-              <a:t> 4  fade </a:t>
-            </a:r>
-            <a:r>
-              <a:rPr lang="de-DE" dirty="0" err="1"/>
-              <a:t>up</a:t>
-            </a:r>
-            <a:endParaRPr lang="de-DE" dirty="0"/>
-          </a:p>
-          <a:p>
-            <a:r>
-              <a:rPr lang="de-DE" dirty="0" err="1"/>
-              <a:t>Audiochannel</a:t>
-            </a:r>
-            <a:r>
-              <a:rPr lang="de-DE" dirty="0"/>
-              <a:t> 1,2,3 fade down</a:t>
-            </a:r>
-          </a:p>
-          <a:p>
-            <a:endParaRPr lang="de-DE" dirty="0"/>
-          </a:p>
-          <a:p>
-            <a:endParaRPr lang="de-DE" dirty="0"/>
+          <a:bodyPr>
+            <a:normAutofit/>
+          </a:bodyPr>
+          <a:lstStyle/>
+          <a:p>
+            <a:r>
+              <a:rPr lang="de-DE" dirty="0" err="1"/>
+              <a:t>Beamer</a:t>
+            </a:r>
+            <a:r>
+              <a:rPr lang="de-DE" dirty="0"/>
+              <a:t> analog </a:t>
+            </a:r>
+            <a:r>
+              <a:rPr lang="de-DE" dirty="0" err="1"/>
+              <a:t>input</a:t>
+            </a:r>
+            <a:endParaRPr lang="de-DE" dirty="0"/>
+          </a:p>
+          <a:p>
+            <a:r>
+              <a:rPr lang="de-DE" dirty="0"/>
+              <a:t>Audio Mix Profile ‚Diashow‘</a:t>
+            </a:r>
+          </a:p>
+          <a:p>
+            <a:r>
+              <a:rPr lang="de-DE" dirty="0"/>
+              <a:t>HDMI Switch </a:t>
+            </a:r>
+            <a:r>
+              <a:rPr lang="de-DE" dirty="0" err="1"/>
+              <a:t>channel</a:t>
+            </a:r>
+            <a:r>
+              <a:rPr lang="de-DE" dirty="0"/>
+              <a:t> 1 (Laptop PPP)</a:t>
+            </a:r>
+          </a:p>
+          <a:p>
+            <a:r>
+              <a:rPr lang="de-DE" dirty="0"/>
+              <a:t>Pause, Text 1 and Text 2</a:t>
+            </a:r>
           </a:p>
           <a:p>
             <a:endParaRPr lang="de-DE" dirty="0"/>
@@ -3460,33 +3425,29 @@
                   <a:srgbClr val="FF0000"/>
                 </a:solidFill>
               </a:rPr>
-              <a:t>                                                                          A4</a:t>
-            </a:r>
+              <a:t>                                                                               BA</a:t>
+            </a:r>
+            <a:endParaRPr lang="de-DE" dirty="0"/>
+          </a:p>
+          <a:p>
             <a:endParaRPr lang="de-DE" dirty="0"/>
           </a:p>
           <a:p>
             <a:pPr marL="0" indent="0">
               <a:buNone/>
             </a:pPr>
-            <a:endParaRPr lang="de-DE" dirty="0"/>
-          </a:p>
-          <a:p>
-            <a:pPr marL="0" indent="0">
-              <a:buNone/>
-            </a:pPr>
-            <a:r>
-              <a:rPr lang="de-DE" dirty="0"/>
-              <a:t>JokiAutomation.exe "Audio_Kanal4"</a:t>
-            </a:r>
-          </a:p>
-          <a:p>
-            <a:pPr marL="0" indent="0">
-              <a:buNone/>
-            </a:pPr>
-            <a:endParaRPr lang="de-DE" dirty="0"/>
-          </a:p>
-          <a:p>
-            <a:endParaRPr lang="de-DE" dirty="0"/>
+            <a:r>
+              <a:rPr lang="de-DE" sz="1800" dirty="0"/>
+              <a:t>JokiAutomation.exe "</a:t>
+            </a:r>
+            <a:r>
+              <a:rPr lang="de-DE" sz="1800" dirty="0" err="1"/>
+              <a:t>BEAMER_VideoClip</a:t>
+            </a:r>
+            <a:r>
+              <a:rPr lang="de-DE" sz="1800" dirty="0"/>
+              <a:t>" "Urheberrechtlich keine Liveübertragung" "Es geht in Kürze weiter"</a:t>
+            </a:r>
           </a:p>
         </p:txBody>
       </p:sp>
@@ -3505,7 +3466,7 @@
         </p:nvSpPr>
         <p:spPr>
           <a:xfrm>
-            <a:off x="5349765" y="3993931"/>
+            <a:off x="5307724" y="3983420"/>
             <a:ext cx="1492469" cy="693683"/>
           </a:xfrm>
           <a:prstGeom prst="rightArrow">
@@ -3532,15 +3493,44 @@
           <a:bodyPr rtlCol="0" anchor="ctr"/>
           <a:lstStyle/>
           <a:p>
-            <a:pPr algn="ctr"/>
-            <a:endParaRPr lang="de-DE" dirty="0"/>
+            <a:pPr marL="0" marR="0" lvl="0" indent="0" algn="ctr" defTabSz="457200" rtl="0" eaLnBrk="1" fontAlgn="auto" latinLnBrk="0" hangingPunct="1">
+              <a:lnSpc>
+                <a:spcPct val="100000"/>
+              </a:lnSpc>
+              <a:spcBef>
+                <a:spcPts val="0"/>
+              </a:spcBef>
+              <a:spcAft>
+                <a:spcPts val="0"/>
+              </a:spcAft>
+              <a:buClrTx/>
+              <a:buSzTx/>
+              <a:buFontTx/>
+              <a:buNone/>
+              <a:tabLst/>
+              <a:defRPr/>
+            </a:pPr>
+            <a:endParaRPr kumimoji="0" lang="de-DE" sz="1800" b="0" i="0" u="none" strike="noStrike" kern="1200" cap="none" spc="0" normalizeH="0" baseline="0" noProof="0" dirty="0">
+              <a:ln>
+                <a:noFill/>
+              </a:ln>
+              <a:solidFill>
+                <a:prstClr val="white"/>
+              </a:solidFill>
+              <a:effectLst/>
+              <a:uLnTx/>
+              <a:uFillTx/>
+              <a:latin typeface="Calibri"/>
+              <a:ea typeface="+mn-ea"/>
+              <a:cs typeface="+mn-cs"/>
+            </a:endParaRPr>
           </a:p>
         </p:txBody>
       </p:sp>
     </p:spTree>
     <p:extLst>
       <p:ext uri="{BB962C8B-B14F-4D97-AF65-F5344CB8AC3E}">
-        <p14:creationId xmlns:p14="http://schemas.microsoft.com/office/powerpoint/2010/main" val="3009062284"/>
+        <p14:creationId xmlns:p14="http://schemas.microsoft.com/office/powerpoint/2010/main" val="1477986772"/>
       </p:ext>
     </p:extLst>
   </p:cSld>
@@ -3594,8 +3584,13 @@
             </a:r>
             <a:r>
               <a:rPr lang="de-DE" dirty="0"/>
-              <a:t> PPP View</a:t>
-            </a:r>
+              <a:t> Mute / </a:t>
+            </a:r>
+            <a:r>
+              <a:rPr lang="de-DE" dirty="0" err="1"/>
+              <a:t>Demute</a:t>
+            </a:r>
+            <a:endParaRPr lang="de-DE" dirty="0"/>
           </a:p>
         </p:txBody>
       </p:sp>
@@ -3628,12 +3623,16 @@
           <a:lstStyle/>
           <a:p>
             <a:r>
-              <a:rPr lang="de-DE" dirty="0"/>
-              <a:t>Switch </a:t>
-            </a:r>
-            <a:r>
-              <a:rPr lang="de-DE" dirty="0" err="1"/>
-              <a:t>beamer</a:t>
+              <a:rPr lang="de-DE" dirty="0" err="1"/>
+              <a:t>mutes</a:t>
+            </a:r>
+            <a:r>
+              <a:rPr lang="de-DE" dirty="0"/>
+              <a:t> / </a:t>
+            </a:r>
+            <a:r>
+              <a:rPr lang="de-DE" dirty="0" err="1"/>
+              <a:t>demutes</a:t>
             </a:r>
             <a:r>
               <a:rPr lang="de-DE" dirty="0"/>
@@ -3641,20 +3640,17 @@
             </a:r>
             <a:r>
               <a:rPr lang="de-DE" dirty="0" err="1"/>
-              <a:t>to</a:t>
-            </a:r>
-            <a:r>
-              <a:rPr lang="de-DE" dirty="0"/>
-              <a:t> HDMI 1 (Laptop PPP </a:t>
-            </a:r>
-            <a:r>
-              <a:rPr lang="de-DE" dirty="0" err="1"/>
-              <a:t>view</a:t>
-            </a:r>
-            <a:r>
-              <a:rPr lang="de-DE" dirty="0"/>
-              <a:t>)</a:t>
-            </a:r>
+              <a:t>the</a:t>
+            </a:r>
+            <a:r>
+              <a:rPr lang="de-DE" dirty="0"/>
+              <a:t> </a:t>
+            </a:r>
+            <a:r>
+              <a:rPr lang="de-DE" dirty="0" err="1"/>
+              <a:t>Beamer</a:t>
+            </a:r>
+            <a:endParaRPr lang="de-DE" dirty="0"/>
           </a:p>
           <a:p>
             <a:endParaRPr lang="de-DE" dirty="0"/>
@@ -3678,7 +3674,7 @@
                   <a:srgbClr val="FF0000"/>
                 </a:solidFill>
               </a:rPr>
-              <a:t>                                                                         B1</a:t>
+              <a:t>                                                                         BM</a:t>
             </a:r>
             <a:endParaRPr lang="de-DE" dirty="0"/>
           </a:p>
@@ -3694,7 +3690,15 @@
             </a:pPr>
             <a:r>
               <a:rPr lang="fr-FR" dirty="0"/>
-              <a:t>JokiAutomation.exe  "BEAMER_PPP"</a:t>
+              <a:t>JokiAutomation.exe  "</a:t>
+            </a:r>
+            <a:r>
+              <a:rPr lang="fr-FR" dirty="0" err="1"/>
+              <a:t>BEAMER_Mute</a:t>
+            </a:r>
+            <a:r>
+              <a:rPr lang="fr-FR" dirty="0"/>
+              <a:t>"</a:t>
             </a:r>
             <a:endParaRPr lang="de-DE" dirty="0"/>
           </a:p>
@@ -3779,7 +3783,7 @@
     </p:spTree>
     <p:extLst>
       <p:ext uri="{BB962C8B-B14F-4D97-AF65-F5344CB8AC3E}">
-        <p14:creationId xmlns:p14="http://schemas.microsoft.com/office/powerpoint/2010/main" val="1338737363"/>
+        <p14:creationId xmlns:p14="http://schemas.microsoft.com/office/powerpoint/2010/main" val="341270607"/>
       </p:ext>
     </p:extLst>
   </p:cSld>
@@ -3829,12 +3833,17 @@
           <a:p>
             <a:r>
               <a:rPr lang="de-DE" dirty="0" err="1"/>
-              <a:t>Beamer</a:t>
-            </a:r>
-            <a:r>
-              <a:rPr lang="de-DE" dirty="0"/>
-              <a:t> Livestream -  View</a:t>
-            </a:r>
+              <a:t>shut</a:t>
+            </a:r>
+            <a:r>
+              <a:rPr lang="de-DE" dirty="0"/>
+              <a:t> down </a:t>
+            </a:r>
+            <a:r>
+              <a:rPr lang="de-DE" dirty="0" err="1"/>
+              <a:t>sequence</a:t>
+            </a:r>
+            <a:endParaRPr lang="de-DE" dirty="0"/>
           </a:p>
         </p:txBody>
       </p:sp>
@@ -3862,531 +3871,19 @@
         </p:spPr>
         <p:txBody>
           <a:bodyPr>
-            <a:normAutofit lnSpcReduction="10000"/>
+            <a:normAutofit fontScale="92500" lnSpcReduction="10000"/>
           </a:bodyPr>
           <a:lstStyle/>
           <a:p>
             <a:r>
-              <a:rPr lang="de-DE" dirty="0"/>
-              <a:t>Switch </a:t>
-            </a:r>
-            <a:r>
-              <a:rPr lang="de-DE" dirty="0" err="1"/>
-              <a:t>beamer</a:t>
-            </a:r>
-            <a:r>
-              <a:rPr lang="de-DE" dirty="0"/>
-              <a:t> </a:t>
-            </a:r>
-            <a:r>
-              <a:rPr lang="de-DE" dirty="0" err="1"/>
-              <a:t>to</a:t>
-            </a:r>
-            <a:r>
-              <a:rPr lang="de-DE" dirty="0"/>
-              <a:t> HDMI 2 (Livestream -  </a:t>
-            </a:r>
-            <a:r>
-              <a:rPr lang="de-DE" dirty="0" err="1"/>
-              <a:t>view</a:t>
-            </a:r>
-            <a:r>
-              <a:rPr lang="de-DE" dirty="0"/>
-              <a:t>)</a:t>
-            </a:r>
-          </a:p>
-          <a:p>
-            <a:endParaRPr lang="de-DE" dirty="0"/>
-          </a:p>
-          <a:p>
-            <a:endParaRPr lang="de-DE" dirty="0"/>
-          </a:p>
-          <a:p>
-            <a:endParaRPr lang="de-DE" dirty="0"/>
-          </a:p>
-          <a:p>
-            <a:endParaRPr lang="de-DE" dirty="0"/>
-          </a:p>
-          <a:p>
-            <a:pPr marL="0" indent="0">
-              <a:buNone/>
-            </a:pPr>
-            <a:r>
-              <a:rPr lang="de-DE" dirty="0">
-                <a:solidFill>
-                  <a:srgbClr val="FF0000"/>
-                </a:solidFill>
-              </a:rPr>
-              <a:t>                                                                         B2</a:t>
-            </a:r>
-            <a:endParaRPr lang="de-DE" dirty="0"/>
-          </a:p>
-          <a:p>
-            <a:pPr marL="0" indent="0">
-              <a:buNone/>
-            </a:pPr>
-            <a:endParaRPr lang="de-DE" dirty="0"/>
-          </a:p>
-          <a:p>
-            <a:pPr marL="0" indent="0">
-              <a:buNone/>
-            </a:pPr>
-            <a:endParaRPr lang="de-DE" dirty="0"/>
-          </a:p>
-          <a:p>
-            <a:pPr marL="0" indent="0">
-              <a:buNone/>
-            </a:pPr>
-            <a:r>
-              <a:rPr lang="fr-FR" dirty="0"/>
-              <a:t>JokiAutomation.exe  "</a:t>
-            </a:r>
-            <a:r>
-              <a:rPr lang="fr-FR" dirty="0" err="1"/>
-              <a:t>BEAMER_LiveStream</a:t>
-            </a:r>
-            <a:r>
-              <a:rPr lang="fr-FR" dirty="0"/>
-              <a:t>"</a:t>
-            </a:r>
-            <a:endParaRPr lang="de-DE" dirty="0"/>
-          </a:p>
-        </p:txBody>
-      </p:sp>
-      <p:sp>
-        <p:nvSpPr>
-          <p:cNvPr id="4" name="Pfeil: nach rechts 3">
-            <a:hlinkClick r:id="rId2" action="ppaction://program"/>
-            <a:extLst>
-              <a:ext uri="{FF2B5EF4-FFF2-40B4-BE49-F238E27FC236}">
-                <a16:creationId xmlns:a16="http://schemas.microsoft.com/office/drawing/2014/main" id="{5D07DC50-91BF-4A42-B5AF-0D3DC4A229F5}"/>
-              </a:ext>
-            </a:extLst>
-          </p:cNvPr>
-          <p:cNvSpPr/>
-          <p:nvPr/>
-        </p:nvSpPr>
-        <p:spPr>
-          <a:xfrm>
-            <a:off x="5307724" y="3983420"/>
-            <a:ext cx="1492469" cy="693683"/>
-          </a:xfrm>
-          <a:prstGeom prst="rightArrow">
-            <a:avLst/>
-          </a:prstGeom>
-        </p:spPr>
-        <p:style>
-          <a:lnRef idx="2">
-            <a:schemeClr val="accent1">
-              <a:shade val="50000"/>
-            </a:schemeClr>
-          </a:lnRef>
-          <a:fillRef idx="1">
-            <a:schemeClr val="accent1"/>
-          </a:fillRef>
-          <a:effectRef idx="0">
-            <a:schemeClr val="accent1"/>
-          </a:effectRef>
-          <a:fontRef idx="minor">
-            <a:schemeClr val="lt1"/>
-          </a:fontRef>
-        </p:style>
-        <p:txBody>
-          <a:bodyPr rtlCol="0" anchor="ctr"/>
-          <a:lstStyle/>
-          <a:p>
-            <a:pPr marL="0" marR="0" lvl="0" indent="0" algn="ctr" defTabSz="457200" rtl="0" eaLnBrk="1" fontAlgn="auto" latinLnBrk="0" hangingPunct="1">
-              <a:lnSpc>
-                <a:spcPct val="100000"/>
-              </a:lnSpc>
-              <a:spcBef>
-                <a:spcPts val="0"/>
-              </a:spcBef>
-              <a:spcAft>
-                <a:spcPts val="0"/>
-              </a:spcAft>
-              <a:buClrTx/>
-              <a:buSzTx/>
-              <a:buFontTx/>
-              <a:buNone/>
-              <a:tabLst/>
-              <a:defRPr/>
-            </a:pPr>
-            <a:endParaRPr kumimoji="0" lang="de-DE" sz="1800" b="0" i="0" u="none" strike="noStrike" kern="1200" cap="none" spc="0" normalizeH="0" baseline="0" noProof="0" dirty="0">
-              <a:ln>
-                <a:noFill/>
-              </a:ln>
-              <a:solidFill>
-                <a:prstClr val="white"/>
-              </a:solidFill>
-              <a:effectLst/>
-              <a:uLnTx/>
-              <a:uFillTx/>
-              <a:latin typeface="Calibri"/>
-              <a:ea typeface="+mn-ea"/>
-              <a:cs typeface="+mn-cs"/>
-            </a:endParaRPr>
-          </a:p>
-        </p:txBody>
-      </p:sp>
-    </p:spTree>
-    <p:extLst>
-      <p:ext uri="{BB962C8B-B14F-4D97-AF65-F5344CB8AC3E}">
-        <p14:creationId xmlns:p14="http://schemas.microsoft.com/office/powerpoint/2010/main" val="2139964971"/>
-      </p:ext>
-    </p:extLst>
-  </p:cSld>
-  <p:clrMapOvr>
-    <a:masterClrMapping/>
-  </p:clrMapOvr>
-</p:sld>
-</file>
-
-<file path=ppt/slides/slide13.xml><?xml version="1.0" encoding="utf-8"?>
-<p:sld xmlns:a="http://schemas.openxmlformats.org/drawingml/2006/main" xmlns:r="http://schemas.openxmlformats.org/officeDocument/2006/relationships" xmlns:p="http://schemas.openxmlformats.org/presentationml/2006/main">
-  <p:cSld>
-    <p:spTree>
-      <p:nvGrpSpPr>
-        <p:cNvPr id="1" name=""/>
-        <p:cNvGrpSpPr/>
-        <p:nvPr/>
-      </p:nvGrpSpPr>
-      <p:grpSpPr>
-        <a:xfrm>
-          <a:off x="0" y="0"/>
-          <a:ext cx="0" cy="0"/>
-          <a:chOff x="0" y="0"/>
-          <a:chExt cx="0" cy="0"/>
-        </a:xfrm>
-      </p:grpSpPr>
-      <p:sp>
-        <p:nvSpPr>
-          <p:cNvPr id="2" name="Titel 1">
-            <a:extLst>
-              <a:ext uri="{FF2B5EF4-FFF2-40B4-BE49-F238E27FC236}">
-                <a16:creationId xmlns:a16="http://schemas.microsoft.com/office/drawing/2014/main" id="{19DD5F15-9C27-4730-80B4-4B8CA5C3D954}"/>
-              </a:ext>
-            </a:extLst>
-          </p:cNvPr>
-          <p:cNvSpPr>
-            <a:spLocks noGrp="1"/>
-          </p:cNvSpPr>
-          <p:nvPr>
-            <p:ph type="title"/>
-          </p:nvPr>
-        </p:nvSpPr>
-        <p:spPr/>
-        <p:txBody>
-          <a:bodyPr/>
-          <a:lstStyle/>
-          <a:p>
-            <a:r>
-              <a:rPr lang="de-DE" dirty="0" err="1"/>
-              <a:t>Beamer</a:t>
-            </a:r>
-            <a:r>
-              <a:rPr lang="de-DE" dirty="0"/>
-              <a:t> Videoclip Text 1  Text 2</a:t>
-            </a:r>
-          </a:p>
-        </p:txBody>
-      </p:sp>
-      <p:sp>
-        <p:nvSpPr>
-          <p:cNvPr id="3" name="Inhaltsplatzhalter 2">
-            <a:extLst>
-              <a:ext uri="{FF2B5EF4-FFF2-40B4-BE49-F238E27FC236}">
-                <a16:creationId xmlns:a16="http://schemas.microsoft.com/office/drawing/2014/main" id="{E47621BA-2F32-4AB0-8C4C-5362CB4F4EC5}"/>
-              </a:ext>
-            </a:extLst>
-          </p:cNvPr>
-          <p:cNvSpPr>
-            <a:spLocks noGrp="1"/>
-          </p:cNvSpPr>
-          <p:nvPr>
-            <p:ph idx="1"/>
-          </p:nvPr>
-        </p:nvSpPr>
-        <p:spPr>
-          <a:xfrm>
-            <a:off x="838200" y="1807751"/>
-            <a:ext cx="10515600" cy="4351338"/>
-          </a:xfrm>
-        </p:spPr>
-        <p:txBody>
-          <a:bodyPr>
-            <a:normAutofit lnSpcReduction="10000"/>
-          </a:bodyPr>
-          <a:lstStyle/>
-          <a:p>
-            <a:r>
-              <a:rPr lang="de-DE" dirty="0" err="1"/>
-              <a:t>Beamer</a:t>
-            </a:r>
-            <a:r>
-              <a:rPr lang="de-DE" dirty="0"/>
-              <a:t> analog </a:t>
-            </a:r>
-            <a:r>
-              <a:rPr lang="de-DE" dirty="0" err="1"/>
-              <a:t>input</a:t>
-            </a:r>
-            <a:endParaRPr lang="de-DE" dirty="0"/>
-          </a:p>
-          <a:p>
-            <a:r>
-              <a:rPr lang="de-DE" dirty="0" err="1"/>
-              <a:t>Audiochannel</a:t>
-            </a:r>
-            <a:r>
-              <a:rPr lang="de-DE" dirty="0"/>
-              <a:t> 1 fade </a:t>
-            </a:r>
-            <a:r>
-              <a:rPr lang="de-DE" dirty="0" err="1"/>
-              <a:t>up</a:t>
-            </a:r>
-            <a:endParaRPr lang="de-DE" dirty="0"/>
-          </a:p>
-          <a:p>
-            <a:r>
-              <a:rPr lang="de-DE" dirty="0" err="1"/>
-              <a:t>Audiochannel</a:t>
-            </a:r>
-            <a:r>
-              <a:rPr lang="de-DE" dirty="0"/>
-              <a:t> 2,3,4 fade down</a:t>
-            </a:r>
-          </a:p>
-          <a:p>
-            <a:r>
-              <a:rPr lang="de-DE" dirty="0"/>
-              <a:t>HDMI Switch </a:t>
-            </a:r>
-            <a:r>
-              <a:rPr lang="de-DE" dirty="0" err="1"/>
-              <a:t>channel</a:t>
-            </a:r>
-            <a:r>
-              <a:rPr lang="de-DE" dirty="0"/>
-              <a:t> 1 (Laptop PPP)</a:t>
-            </a:r>
-          </a:p>
-          <a:p>
-            <a:r>
-              <a:rPr lang="de-DE" dirty="0"/>
-              <a:t>Pause, Text 1 and Text 2</a:t>
-            </a:r>
-          </a:p>
-          <a:p>
-            <a:endParaRPr lang="de-DE" dirty="0"/>
-          </a:p>
-          <a:p>
-            <a:pPr marL="0" indent="0">
-              <a:buNone/>
-            </a:pPr>
-            <a:r>
-              <a:rPr lang="de-DE" dirty="0">
-                <a:solidFill>
-                  <a:srgbClr val="FF0000"/>
-                </a:solidFill>
-              </a:rPr>
-              <a:t>                                                                               1 B3 A1</a:t>
-            </a:r>
-            <a:endParaRPr lang="de-DE" dirty="0"/>
-          </a:p>
-          <a:p>
-            <a:endParaRPr lang="de-DE" dirty="0"/>
-          </a:p>
-          <a:p>
-            <a:pPr marL="0" indent="0">
-              <a:buNone/>
-            </a:pPr>
-            <a:r>
-              <a:rPr lang="de-DE" sz="1800" dirty="0"/>
-              <a:t>JokiAutomation.exe "</a:t>
-            </a:r>
-            <a:r>
-              <a:rPr lang="de-DE" sz="1800" dirty="0" err="1"/>
-              <a:t>BEAMER_VideoClip</a:t>
-            </a:r>
-            <a:r>
-              <a:rPr lang="de-DE" sz="1800" dirty="0"/>
-              <a:t>" "Urheberrechtlich keine Liveübertragung" "Es geht in Kürze weiter"</a:t>
-            </a:r>
-          </a:p>
-        </p:txBody>
-      </p:sp>
-      <p:sp>
-        <p:nvSpPr>
-          <p:cNvPr id="4" name="Pfeil: nach rechts 3">
-            <a:hlinkClick r:id="rId2" action="ppaction://program"/>
-            <a:extLst>
-              <a:ext uri="{FF2B5EF4-FFF2-40B4-BE49-F238E27FC236}">
-                <a16:creationId xmlns:a16="http://schemas.microsoft.com/office/drawing/2014/main" id="{5D07DC50-91BF-4A42-B5AF-0D3DC4A229F5}"/>
-              </a:ext>
-            </a:extLst>
-          </p:cNvPr>
-          <p:cNvSpPr/>
-          <p:nvPr/>
-        </p:nvSpPr>
-        <p:spPr>
-          <a:xfrm>
-            <a:off x="5307724" y="3983420"/>
-            <a:ext cx="1492469" cy="693683"/>
-          </a:xfrm>
-          <a:prstGeom prst="rightArrow">
-            <a:avLst/>
-          </a:prstGeom>
-        </p:spPr>
-        <p:style>
-          <a:lnRef idx="2">
-            <a:schemeClr val="accent1">
-              <a:shade val="50000"/>
-            </a:schemeClr>
-          </a:lnRef>
-          <a:fillRef idx="1">
-            <a:schemeClr val="accent1"/>
-          </a:fillRef>
-          <a:effectRef idx="0">
-            <a:schemeClr val="accent1"/>
-          </a:effectRef>
-          <a:fontRef idx="minor">
-            <a:schemeClr val="lt1"/>
-          </a:fontRef>
-        </p:style>
-        <p:txBody>
-          <a:bodyPr rtlCol="0" anchor="ctr"/>
-          <a:lstStyle/>
-          <a:p>
-            <a:pPr marL="0" marR="0" lvl="0" indent="0" algn="ctr" defTabSz="457200" rtl="0" eaLnBrk="1" fontAlgn="auto" latinLnBrk="0" hangingPunct="1">
-              <a:lnSpc>
-                <a:spcPct val="100000"/>
-              </a:lnSpc>
-              <a:spcBef>
-                <a:spcPts val="0"/>
-              </a:spcBef>
-              <a:spcAft>
-                <a:spcPts val="0"/>
-              </a:spcAft>
-              <a:buClrTx/>
-              <a:buSzTx/>
-              <a:buFontTx/>
-              <a:buNone/>
-              <a:tabLst/>
-              <a:defRPr/>
-            </a:pPr>
-            <a:endParaRPr kumimoji="0" lang="de-DE" sz="1800" b="0" i="0" u="none" strike="noStrike" kern="1200" cap="none" spc="0" normalizeH="0" baseline="0" noProof="0" dirty="0">
-              <a:ln>
-                <a:noFill/>
-              </a:ln>
-              <a:solidFill>
-                <a:prstClr val="white"/>
-              </a:solidFill>
-              <a:effectLst/>
-              <a:uLnTx/>
-              <a:uFillTx/>
-              <a:latin typeface="Calibri"/>
-              <a:ea typeface="+mn-ea"/>
-              <a:cs typeface="+mn-cs"/>
-            </a:endParaRPr>
-          </a:p>
-        </p:txBody>
-      </p:sp>
-    </p:spTree>
-    <p:extLst>
-      <p:ext uri="{BB962C8B-B14F-4D97-AF65-F5344CB8AC3E}">
-        <p14:creationId xmlns:p14="http://schemas.microsoft.com/office/powerpoint/2010/main" val="1477986772"/>
-      </p:ext>
-    </p:extLst>
-  </p:cSld>
-  <p:clrMapOvr>
-    <a:masterClrMapping/>
-  </p:clrMapOvr>
-</p:sld>
-</file>
-
-<file path=ppt/slides/slide14.xml><?xml version="1.0" encoding="utf-8"?>
-<p:sld xmlns:a="http://schemas.openxmlformats.org/drawingml/2006/main" xmlns:r="http://schemas.openxmlformats.org/officeDocument/2006/relationships" xmlns:p="http://schemas.openxmlformats.org/presentationml/2006/main">
-  <p:cSld>
-    <p:spTree>
-      <p:nvGrpSpPr>
-        <p:cNvPr id="1" name=""/>
-        <p:cNvGrpSpPr/>
-        <p:nvPr/>
-      </p:nvGrpSpPr>
-      <p:grpSpPr>
-        <a:xfrm>
-          <a:off x="0" y="0"/>
-          <a:ext cx="0" cy="0"/>
-          <a:chOff x="0" y="0"/>
-          <a:chExt cx="0" cy="0"/>
-        </a:xfrm>
-      </p:grpSpPr>
-      <p:sp>
-        <p:nvSpPr>
-          <p:cNvPr id="2" name="Titel 1">
-            <a:extLst>
-              <a:ext uri="{FF2B5EF4-FFF2-40B4-BE49-F238E27FC236}">
-                <a16:creationId xmlns:a16="http://schemas.microsoft.com/office/drawing/2014/main" id="{19DD5F15-9C27-4730-80B4-4B8CA5C3D954}"/>
-              </a:ext>
-            </a:extLst>
-          </p:cNvPr>
-          <p:cNvSpPr>
-            <a:spLocks noGrp="1"/>
-          </p:cNvSpPr>
-          <p:nvPr>
-            <p:ph type="title"/>
-          </p:nvPr>
-        </p:nvSpPr>
-        <p:spPr/>
-        <p:txBody>
-          <a:bodyPr/>
-          <a:lstStyle/>
-          <a:p>
-            <a:r>
-              <a:rPr lang="de-DE" dirty="0" err="1"/>
-              <a:t>shut</a:t>
-            </a:r>
-            <a:r>
-              <a:rPr lang="de-DE" dirty="0"/>
-              <a:t> down </a:t>
-            </a:r>
-            <a:r>
-              <a:rPr lang="de-DE" dirty="0" err="1"/>
-              <a:t>sequence</a:t>
-            </a:r>
-            <a:endParaRPr lang="de-DE" dirty="0"/>
-          </a:p>
-        </p:txBody>
-      </p:sp>
-      <p:sp>
-        <p:nvSpPr>
-          <p:cNvPr id="3" name="Inhaltsplatzhalter 2">
-            <a:extLst>
-              <a:ext uri="{FF2B5EF4-FFF2-40B4-BE49-F238E27FC236}">
-                <a16:creationId xmlns:a16="http://schemas.microsoft.com/office/drawing/2014/main" id="{E47621BA-2F32-4AB0-8C4C-5362CB4F4EC5}"/>
-              </a:ext>
-            </a:extLst>
-          </p:cNvPr>
-          <p:cNvSpPr>
-            <a:spLocks noGrp="1"/>
-          </p:cNvSpPr>
-          <p:nvPr>
-            <p:ph idx="1"/>
-          </p:nvPr>
-        </p:nvSpPr>
-        <p:spPr>
-          <a:xfrm>
-            <a:off x="838200" y="1807751"/>
-            <a:ext cx="10515600" cy="4351338"/>
-          </a:xfrm>
-        </p:spPr>
-        <p:txBody>
-          <a:bodyPr>
-            <a:normAutofit/>
-          </a:bodyPr>
-          <a:lstStyle/>
+              <a:rPr lang="de-DE" dirty="0" err="1"/>
+              <a:t>Stop</a:t>
+            </a:r>
+            <a:r>
+              <a:rPr lang="de-DE" dirty="0"/>
+              <a:t> Backup Recorder</a:t>
+            </a:r>
+          </a:p>
           <a:p>
             <a:r>
               <a:rPr lang="de-DE" dirty="0"/>
@@ -4657,7 +4154,7 @@
         </p:spPr>
         <p:txBody>
           <a:bodyPr>
-            <a:normAutofit fontScale="92500" lnSpcReduction="20000"/>
+            <a:normAutofit lnSpcReduction="10000"/>
           </a:bodyPr>
           <a:lstStyle/>
           <a:p>
@@ -4680,27 +4177,8 @@
           </a:p>
           <a:p>
             <a:r>
-              <a:rPr lang="de-DE" dirty="0" err="1"/>
-              <a:t>Audiochannel</a:t>
-            </a:r>
-            <a:r>
-              <a:rPr lang="de-DE" dirty="0"/>
-              <a:t> 1 fade </a:t>
-            </a:r>
-            <a:r>
-              <a:rPr lang="de-DE" dirty="0" err="1"/>
-              <a:t>up</a:t>
-            </a:r>
-            <a:endParaRPr lang="de-DE" dirty="0"/>
-          </a:p>
-          <a:p>
-            <a:r>
-              <a:rPr lang="de-DE" dirty="0" err="1"/>
-              <a:t>Audiochannel</a:t>
-            </a:r>
-            <a:r>
-              <a:rPr lang="de-DE" dirty="0"/>
-              <a:t> 2,3,4 fade down</a:t>
+              <a:rPr lang="de-DE" dirty="0"/>
+              <a:t>Audio Mix Profile ‚Diashow‘</a:t>
             </a:r>
           </a:p>
           <a:p>
@@ -4744,19 +4222,7 @@
                   <a:srgbClr val="FF0000"/>
                 </a:solidFill>
               </a:rPr>
-              <a:t>1 B1</a:t>
-            </a:r>
-            <a:r>
-              <a:rPr lang="de-DE" dirty="0"/>
-              <a:t> </a:t>
-            </a:r>
-            <a:r>
-              <a:rPr lang="de-DE" dirty="0">
-                <a:solidFill>
-                  <a:srgbClr val="FF0000"/>
-                </a:solidFill>
-              </a:rPr>
-              <a:t>A1</a:t>
+              <a:t>P</a:t>
             </a:r>
           </a:p>
           <a:p>
@@ -4925,7 +4391,7 @@
         </p:spPr>
         <p:txBody>
           <a:bodyPr>
-            <a:normAutofit lnSpcReduction="10000"/>
+            <a:normAutofit/>
           </a:bodyPr>
           <a:lstStyle/>
           <a:p>
@@ -4948,67 +4414,8 @@
           </a:p>
           <a:p>
             <a:r>
-              <a:rPr lang="de-DE" dirty="0" err="1"/>
-              <a:t>Audiochannel</a:t>
-            </a:r>
-            <a:r>
-              <a:rPr lang="de-DE" dirty="0"/>
-              <a:t> 2 (</a:t>
-            </a:r>
-            <a:r>
-              <a:rPr lang="de-DE" dirty="0" err="1"/>
-              <a:t>sumary</a:t>
-            </a:r>
-            <a:r>
-              <a:rPr lang="de-DE" dirty="0"/>
-              <a:t>) </a:t>
-            </a:r>
-            <a:r>
-              <a:rPr lang="de-DE" dirty="0" err="1"/>
-              <a:t>or</a:t>
-            </a:r>
-            <a:r>
-              <a:rPr lang="de-DE" dirty="0"/>
-              <a:t> 3 (</a:t>
-            </a:r>
-            <a:r>
-              <a:rPr lang="de-DE" dirty="0" err="1"/>
-              <a:t>room</a:t>
-            </a:r>
-            <a:r>
-              <a:rPr lang="de-DE" dirty="0"/>
-              <a:t> </a:t>
-            </a:r>
-            <a:r>
-              <a:rPr lang="de-DE" dirty="0" err="1"/>
-              <a:t>microphone</a:t>
-            </a:r>
-            <a:r>
-              <a:rPr lang="de-DE" dirty="0"/>
-              <a:t>) fade </a:t>
-            </a:r>
-            <a:r>
-              <a:rPr lang="de-DE" dirty="0" err="1"/>
-              <a:t>up</a:t>
-            </a:r>
-            <a:endParaRPr lang="de-DE" dirty="0"/>
-          </a:p>
-          <a:p>
-            <a:r>
-              <a:rPr lang="de-DE" dirty="0" err="1"/>
-              <a:t>Audiochannel</a:t>
-            </a:r>
-            <a:r>
-              <a:rPr lang="de-DE" dirty="0"/>
-              <a:t> 1,2 </a:t>
-            </a:r>
-            <a:r>
-              <a:rPr lang="de-DE" dirty="0" err="1"/>
-              <a:t>or</a:t>
-            </a:r>
-            <a:r>
-              <a:rPr lang="de-DE" dirty="0"/>
-              <a:t> 3,4 fade down</a:t>
+              <a:rPr lang="de-DE" dirty="0"/>
+              <a:t>Audio Mix Profile ‚Band‘</a:t>
             </a:r>
           </a:p>
           <a:p>
@@ -5038,19 +4445,7 @@
                   <a:srgbClr val="FF0000"/>
                 </a:solidFill>
               </a:rPr>
-              <a:t>                                                                         1 B1</a:t>
-            </a:r>
-            <a:r>
-              <a:rPr lang="de-DE" dirty="0"/>
-              <a:t> </a:t>
-            </a:r>
-            <a:r>
-              <a:rPr lang="de-DE" dirty="0">
-                <a:solidFill>
-                  <a:srgbClr val="FF0000"/>
-                </a:solidFill>
-              </a:rPr>
-              <a:t>A2</a:t>
+              <a:t>                                                                         L</a:t>
             </a:r>
           </a:p>
           <a:p>
@@ -5210,72 +4605,13 @@
         </p:spPr>
         <p:txBody>
           <a:bodyPr>
-            <a:normAutofit lnSpcReduction="10000"/>
+            <a:normAutofit/>
           </a:bodyPr>
           <a:lstStyle/>
           <a:p>
             <a:r>
-              <a:rPr lang="de-DE" dirty="0" err="1"/>
-              <a:t>Audiochannel</a:t>
-            </a:r>
-            <a:r>
-              <a:rPr lang="de-DE" dirty="0"/>
-              <a:t> 2 (</a:t>
-            </a:r>
-            <a:r>
-              <a:rPr lang="de-DE" dirty="0" err="1"/>
-              <a:t>sumary</a:t>
-            </a:r>
-            <a:r>
-              <a:rPr lang="de-DE" dirty="0"/>
-              <a:t>) </a:t>
-            </a:r>
-            <a:r>
-              <a:rPr lang="de-DE" dirty="0" err="1"/>
-              <a:t>or</a:t>
-            </a:r>
-            <a:r>
-              <a:rPr lang="de-DE" dirty="0"/>
-              <a:t> 3 (</a:t>
-            </a:r>
-            <a:r>
-              <a:rPr lang="de-DE" dirty="0" err="1"/>
-              <a:t>room</a:t>
-            </a:r>
-            <a:r>
-              <a:rPr lang="de-DE" dirty="0"/>
-              <a:t> </a:t>
-            </a:r>
-            <a:r>
-              <a:rPr lang="de-DE" dirty="0" err="1"/>
-              <a:t>microphone</a:t>
-            </a:r>
-            <a:r>
-              <a:rPr lang="de-DE" dirty="0"/>
-              <a:t>) fade </a:t>
-            </a:r>
-            <a:r>
-              <a:rPr lang="de-DE" dirty="0" err="1"/>
-              <a:t>up</a:t>
-            </a:r>
-            <a:endParaRPr lang="de-DE" dirty="0"/>
-          </a:p>
-          <a:p>
-            <a:r>
-              <a:rPr lang="de-DE" dirty="0" err="1"/>
-              <a:t>Audiochannel</a:t>
-            </a:r>
-            <a:r>
-              <a:rPr lang="de-DE" dirty="0"/>
-              <a:t> 1,2 </a:t>
-            </a:r>
-            <a:r>
-              <a:rPr lang="de-DE" dirty="0" err="1"/>
-              <a:t>or</a:t>
-            </a:r>
-            <a:r>
-              <a:rPr lang="de-DE" dirty="0"/>
-              <a:t> 3,4 fade down</a:t>
+              <a:rPr lang="de-DE" dirty="0"/>
+              <a:t>Audio Mix Profile ‚Gottesdienst‘</a:t>
             </a:r>
           </a:p>
           <a:p>
@@ -5308,7 +4644,7 @@
                   <a:srgbClr val="FF0000"/>
                 </a:solidFill>
               </a:rPr>
-              <a:t>                                                                         2 A2</a:t>
+              <a:t>                                                                         G</a:t>
             </a:r>
           </a:p>
           <a:p>
@@ -5506,67 +4842,8 @@
           <a:lstStyle/>
           <a:p>
             <a:r>
-              <a:rPr lang="de-DE" dirty="0" err="1"/>
-              <a:t>Audiochannel</a:t>
-            </a:r>
-            <a:r>
-              <a:rPr lang="de-DE" dirty="0"/>
-              <a:t> 2 (</a:t>
-            </a:r>
-            <a:r>
-              <a:rPr lang="de-DE" dirty="0" err="1"/>
-              <a:t>sumary</a:t>
-            </a:r>
-            <a:r>
-              <a:rPr lang="de-DE" dirty="0"/>
-              <a:t>) </a:t>
-            </a:r>
-            <a:r>
-              <a:rPr lang="de-DE" dirty="0" err="1"/>
-              <a:t>or</a:t>
-            </a:r>
-            <a:r>
-              <a:rPr lang="de-DE" dirty="0"/>
-              <a:t> 3 (</a:t>
-            </a:r>
-            <a:r>
-              <a:rPr lang="de-DE" dirty="0" err="1"/>
-              <a:t>room</a:t>
-            </a:r>
-            <a:r>
-              <a:rPr lang="de-DE" dirty="0"/>
-              <a:t> </a:t>
-            </a:r>
-            <a:r>
-              <a:rPr lang="de-DE" dirty="0" err="1"/>
-              <a:t>microphone</a:t>
-            </a:r>
-            <a:r>
-              <a:rPr lang="de-DE" dirty="0"/>
-              <a:t>) fade </a:t>
-            </a:r>
-            <a:r>
-              <a:rPr lang="de-DE" dirty="0" err="1"/>
-              <a:t>up</a:t>
-            </a:r>
-            <a:endParaRPr lang="de-DE" dirty="0"/>
-          </a:p>
-          <a:p>
-            <a:r>
-              <a:rPr lang="de-DE" dirty="0" err="1"/>
-              <a:t>Audiochannel</a:t>
-            </a:r>
-            <a:r>
-              <a:rPr lang="de-DE" dirty="0"/>
-              <a:t> 1,2 </a:t>
-            </a:r>
-            <a:r>
-              <a:rPr lang="de-DE" dirty="0" err="1"/>
-              <a:t>or</a:t>
-            </a:r>
-            <a:r>
-              <a:rPr lang="de-DE" dirty="0"/>
-              <a:t> 3,4 fade down</a:t>
+              <a:rPr lang="de-DE" dirty="0"/>
+              <a:t>Audio Mix Profile ‚Gottesdienst‘</a:t>
             </a:r>
           </a:p>
           <a:p>
@@ -5634,7 +4911,7 @@
                   <a:srgbClr val="FF0000"/>
                 </a:solidFill>
               </a:rPr>
-              <a:t>                                                                          3 A2</a:t>
+              <a:t>                                                                          A</a:t>
             </a:r>
           </a:p>
           <a:p>
@@ -5810,67 +5087,8 @@
           <a:lstStyle/>
           <a:p>
             <a:r>
-              <a:rPr lang="de-DE" dirty="0" err="1"/>
-              <a:t>Audiochannel</a:t>
-            </a:r>
-            <a:r>
-              <a:rPr lang="de-DE" dirty="0"/>
-              <a:t> 2 (</a:t>
-            </a:r>
-            <a:r>
-              <a:rPr lang="de-DE" dirty="0" err="1"/>
-              <a:t>sumary</a:t>
-            </a:r>
-            <a:r>
-              <a:rPr lang="de-DE" dirty="0"/>
-              <a:t>) </a:t>
-            </a:r>
-            <a:r>
-              <a:rPr lang="de-DE" dirty="0" err="1"/>
-              <a:t>or</a:t>
-            </a:r>
-            <a:r>
-              <a:rPr lang="de-DE" dirty="0"/>
-              <a:t> 3 (</a:t>
-            </a:r>
-            <a:r>
-              <a:rPr lang="de-DE" dirty="0" err="1"/>
-              <a:t>room</a:t>
-            </a:r>
-            <a:r>
-              <a:rPr lang="de-DE" dirty="0"/>
-              <a:t> </a:t>
-            </a:r>
-            <a:r>
-              <a:rPr lang="de-DE" dirty="0" err="1"/>
-              <a:t>microphone</a:t>
-            </a:r>
-            <a:r>
-              <a:rPr lang="de-DE" dirty="0"/>
-              <a:t>) fade </a:t>
-            </a:r>
-            <a:r>
-              <a:rPr lang="de-DE" dirty="0" err="1"/>
-              <a:t>up</a:t>
-            </a:r>
-            <a:endParaRPr lang="de-DE" dirty="0"/>
-          </a:p>
-          <a:p>
-            <a:r>
-              <a:rPr lang="de-DE" dirty="0" err="1"/>
-              <a:t>Audiochannel</a:t>
-            </a:r>
-            <a:r>
-              <a:rPr lang="de-DE" dirty="0"/>
-              <a:t> 1,2 </a:t>
-            </a:r>
-            <a:r>
-              <a:rPr lang="de-DE" dirty="0" err="1"/>
-              <a:t>or</a:t>
-            </a:r>
-            <a:r>
-              <a:rPr lang="de-DE" dirty="0"/>
-              <a:t> 3,4 fade down</a:t>
+              <a:rPr lang="de-DE" dirty="0"/>
+              <a:t>Audio Mix Profile ‚Text‘</a:t>
             </a:r>
           </a:p>
           <a:p>
@@ -5918,7 +5136,7 @@
                   <a:srgbClr val="FF0000"/>
                 </a:solidFill>
               </a:rPr>
-              <a:t>                                                                         5 B1 A2 </a:t>
+              <a:t>                                                                         G </a:t>
             </a:r>
             <a:endParaRPr lang="de-DE" dirty="0"/>
           </a:p>
@@ -6093,72 +5311,13 @@
         </p:spPr>
         <p:txBody>
           <a:bodyPr>
-            <a:normAutofit lnSpcReduction="10000"/>
+            <a:normAutofit/>
           </a:bodyPr>
           <a:lstStyle/>
           <a:p>
             <a:r>
-              <a:rPr lang="de-DE" dirty="0" err="1"/>
-              <a:t>Audiochannel</a:t>
-            </a:r>
-            <a:r>
-              <a:rPr lang="de-DE" dirty="0"/>
-              <a:t> 2 (</a:t>
-            </a:r>
-            <a:r>
-              <a:rPr lang="de-DE" dirty="0" err="1"/>
-              <a:t>sumary</a:t>
-            </a:r>
-            <a:r>
-              <a:rPr lang="de-DE" dirty="0"/>
-              <a:t>) </a:t>
-            </a:r>
-            <a:r>
-              <a:rPr lang="de-DE" dirty="0" err="1"/>
-              <a:t>or</a:t>
-            </a:r>
-            <a:r>
-              <a:rPr lang="de-DE" dirty="0"/>
-              <a:t> 3 (</a:t>
-            </a:r>
-            <a:r>
-              <a:rPr lang="de-DE" dirty="0" err="1"/>
-              <a:t>room</a:t>
-            </a:r>
-            <a:r>
-              <a:rPr lang="de-DE" dirty="0"/>
-              <a:t> </a:t>
-            </a:r>
-            <a:r>
-              <a:rPr lang="de-DE" dirty="0" err="1"/>
-              <a:t>microphone</a:t>
-            </a:r>
-            <a:r>
-              <a:rPr lang="de-DE" dirty="0"/>
-              <a:t>) fade </a:t>
-            </a:r>
-            <a:r>
-              <a:rPr lang="de-DE" dirty="0" err="1"/>
-              <a:t>up</a:t>
-            </a:r>
-            <a:endParaRPr lang="de-DE" dirty="0"/>
-          </a:p>
-          <a:p>
-            <a:r>
-              <a:rPr lang="de-DE" dirty="0" err="1"/>
-              <a:t>Audiochannel</a:t>
-            </a:r>
-            <a:r>
-              <a:rPr lang="de-DE" dirty="0"/>
-              <a:t> 1,2 </a:t>
-            </a:r>
-            <a:r>
-              <a:rPr lang="de-DE" dirty="0" err="1"/>
-              <a:t>or</a:t>
-            </a:r>
-            <a:r>
-              <a:rPr lang="de-DE" dirty="0"/>
-              <a:t> 3,4 fade down</a:t>
+              <a:rPr lang="de-DE" dirty="0"/>
+              <a:t>Audio Mix Profile ‚Predigt‘</a:t>
             </a:r>
           </a:p>
           <a:p>
@@ -6221,7 +5380,7 @@
                   <a:srgbClr val="FF0000"/>
                 </a:solidFill>
               </a:rPr>
-              <a:t>                                                                         4 A2</a:t>
+              <a:t>                                                                         K</a:t>
             </a:r>
           </a:p>
           <a:p>
@@ -6349,48 +5508,12 @@
           <a:lstStyle/>
           <a:p>
             <a:r>
-              <a:rPr lang="de-DE" dirty="0"/>
-              <a:t>Audio </a:t>
-            </a:r>
-            <a:r>
-              <a:rPr lang="de-DE" dirty="0" err="1"/>
-              <a:t>sumary</a:t>
-            </a:r>
-            <a:r>
-              <a:rPr lang="de-DE" dirty="0"/>
-              <a:t>  (</a:t>
-            </a:r>
-            <a:r>
-              <a:rPr lang="de-DE" dirty="0" err="1"/>
-              <a:t>sumary</a:t>
-            </a:r>
-            <a:r>
-              <a:rPr lang="de-DE" dirty="0"/>
-              <a:t> </a:t>
-            </a:r>
-            <a:r>
-              <a:rPr lang="de-DE" dirty="0" err="1"/>
-              <a:t>signal</a:t>
-            </a:r>
-            <a:r>
-              <a:rPr lang="de-DE" dirty="0"/>
-              <a:t> </a:t>
-            </a:r>
-            <a:r>
-              <a:rPr lang="de-DE" dirty="0" err="1"/>
-              <a:t>from</a:t>
-            </a:r>
-            <a:r>
-              <a:rPr lang="de-DE" dirty="0"/>
-              <a:t> </a:t>
-            </a:r>
-            <a:r>
-              <a:rPr lang="de-DE" dirty="0" err="1"/>
-              <a:t>amplifier</a:t>
-            </a:r>
-            <a:r>
-              <a:rPr lang="de-DE" dirty="0"/>
-              <a:t>)</a:t>
+              <a:rPr lang="de-DE" dirty="0" err="1"/>
+              <a:t>Beamer</a:t>
+            </a:r>
+            <a:r>
+              <a:rPr lang="de-DE" dirty="0"/>
+              <a:t> PPP View</a:t>
             </a:r>
           </a:p>
         </p:txBody>
@@ -6418,51 +5541,50 @@
           </a:xfrm>
         </p:spPr>
         <p:txBody>
-          <a:bodyPr/>
-          <a:lstStyle/>
-          <a:p>
-            <a:r>
-              <a:rPr lang="de-DE" dirty="0" err="1"/>
-              <a:t>Audiochannel</a:t>
-            </a:r>
-            <a:r>
-              <a:rPr lang="de-DE" dirty="0"/>
-              <a:t> 2 (</a:t>
-            </a:r>
-            <a:r>
-              <a:rPr lang="de-DE" dirty="0" err="1"/>
-              <a:t>sumary</a:t>
-            </a:r>
-            <a:r>
-              <a:rPr lang="de-DE" dirty="0"/>
-              <a:t>) fade </a:t>
-            </a:r>
-            <a:r>
-              <a:rPr lang="de-DE" dirty="0" err="1"/>
-              <a:t>up</a:t>
-            </a:r>
-            <a:endParaRPr lang="de-DE" dirty="0"/>
-          </a:p>
-          <a:p>
-            <a:r>
-              <a:rPr lang="de-DE" dirty="0" err="1"/>
-              <a:t>Audiochannel</a:t>
-            </a:r>
-            <a:r>
-              <a:rPr lang="de-DE" dirty="0"/>
-              <a:t> 1,3,4 fade down</a:t>
-            </a:r>
-          </a:p>
-          <a:p>
-            <a:endParaRPr lang="de-DE" dirty="0"/>
-          </a:p>
-          <a:p>
-            <a:endParaRPr lang="de-DE" dirty="0"/>
-          </a:p>
-          <a:p>
-            <a:pPr marL="0" indent="0">
-              <a:buNone/>
-            </a:pPr>
+          <a:bodyPr>
+            <a:normAutofit/>
+          </a:bodyPr>
+          <a:lstStyle/>
+          <a:p>
+            <a:r>
+              <a:rPr lang="de-DE" dirty="0"/>
+              <a:t>Switch </a:t>
+            </a:r>
+            <a:r>
+              <a:rPr lang="de-DE" dirty="0" err="1"/>
+              <a:t>beamer</a:t>
+            </a:r>
+            <a:r>
+              <a:rPr lang="de-DE" dirty="0"/>
+              <a:t> </a:t>
+            </a:r>
+            <a:r>
+              <a:rPr lang="de-DE" dirty="0" err="1"/>
+              <a:t>to</a:t>
+            </a:r>
+            <a:r>
+              <a:rPr lang="de-DE" dirty="0"/>
+              <a:t> HDMI 1 (Laptop PPP </a:t>
+            </a:r>
+            <a:r>
+              <a:rPr lang="de-DE" dirty="0" err="1"/>
+              <a:t>view</a:t>
+            </a:r>
+            <a:r>
+              <a:rPr lang="de-DE" dirty="0"/>
+              <a:t>)</a:t>
+            </a:r>
+          </a:p>
+          <a:p>
+            <a:endParaRPr lang="de-DE" dirty="0"/>
+          </a:p>
+          <a:p>
+            <a:endParaRPr lang="de-DE" dirty="0"/>
+          </a:p>
+          <a:p>
+            <a:endParaRPr lang="de-DE" dirty="0"/>
+          </a:p>
+          <a:p>
             <a:endParaRPr lang="de-DE" dirty="0"/>
           </a:p>
           <a:p>
@@ -6475,33 +5597,24 @@
                   <a:srgbClr val="FF0000"/>
                 </a:solidFill>
               </a:rPr>
-              <a:t>                                                                          A2</a:t>
-            </a:r>
+              <a:t>                                                                         BP</a:t>
+            </a:r>
+            <a:endParaRPr lang="de-DE" dirty="0"/>
           </a:p>
           <a:p>
             <a:pPr marL="0" indent="0">
               <a:buNone/>
             </a:pPr>
-            <a:r>
-              <a:rPr lang="de-DE" dirty="0"/>
-              <a:t>JokiAutomation.exe "</a:t>
-            </a:r>
-            <a:r>
-              <a:rPr lang="de-DE" dirty="0" err="1"/>
-              <a:t>Audio_Summensignal</a:t>
-            </a:r>
-            <a:r>
-              <a:rPr lang="de-DE" dirty="0"/>
-              <a:t>"</a:t>
-            </a:r>
+            <a:endParaRPr lang="de-DE" dirty="0"/>
           </a:p>
           <a:p>
             <a:pPr marL="0" indent="0">
               <a:buNone/>
             </a:pPr>
-            <a:endParaRPr lang="de-DE" dirty="0"/>
-          </a:p>
-          <a:p>
+            <a:r>
+              <a:rPr lang="fr-FR" dirty="0"/>
+              <a:t>JokiAutomation.exe  "BEAMER_PPP"</a:t>
+            </a:r>
             <a:endParaRPr lang="de-DE" dirty="0"/>
           </a:p>
         </p:txBody>
@@ -6548,15 +5661,44 @@
           <a:bodyPr rtlCol="0" anchor="ctr"/>
           <a:lstStyle/>
           <a:p>
-            <a:pPr algn="ctr"/>
-            <a:endParaRPr lang="de-DE"/>
+            <a:pPr marL="0" marR="0" lvl="0" indent="0" algn="ctr" defTabSz="457200" rtl="0" eaLnBrk="1" fontAlgn="auto" latinLnBrk="0" hangingPunct="1">
+              <a:lnSpc>
+                <a:spcPct val="100000"/>
+              </a:lnSpc>
+              <a:spcBef>
+                <a:spcPts val="0"/>
+              </a:spcBef>
+              <a:spcAft>
+                <a:spcPts val="0"/>
+              </a:spcAft>
+              <a:buClrTx/>
+              <a:buSzTx/>
+              <a:buFontTx/>
+              <a:buNone/>
+              <a:tabLst/>
+              <a:defRPr/>
+            </a:pPr>
+            <a:endParaRPr kumimoji="0" lang="de-DE" sz="1800" b="0" i="0" u="none" strike="noStrike" kern="1200" cap="none" spc="0" normalizeH="0" baseline="0" noProof="0" dirty="0">
+              <a:ln>
+                <a:noFill/>
+              </a:ln>
+              <a:solidFill>
+                <a:prstClr val="white"/>
+              </a:solidFill>
+              <a:effectLst/>
+              <a:uLnTx/>
+              <a:uFillTx/>
+              <a:latin typeface="Calibri"/>
+              <a:ea typeface="+mn-ea"/>
+              <a:cs typeface="+mn-cs"/>
+            </a:endParaRPr>
           </a:p>
         </p:txBody>
       </p:sp>
     </p:spTree>
     <p:extLst>
       <p:ext uri="{BB962C8B-B14F-4D97-AF65-F5344CB8AC3E}">
-        <p14:creationId xmlns:p14="http://schemas.microsoft.com/office/powerpoint/2010/main" val="2127669776"/>
+        <p14:creationId xmlns:p14="http://schemas.microsoft.com/office/powerpoint/2010/main" val="1338737363"/>
       </p:ext>
     </p:extLst>
   </p:cSld>
@@ -6605,48 +5747,12 @@
           <a:lstStyle/>
           <a:p>
             <a:r>
-              <a:rPr lang="de-DE" dirty="0"/>
-              <a:t>Audio </a:t>
-            </a:r>
-            <a:r>
-              <a:rPr lang="de-DE" dirty="0" err="1"/>
-              <a:t>room</a:t>
-            </a:r>
-            <a:r>
-              <a:rPr lang="de-DE" dirty="0"/>
-              <a:t>  (</a:t>
-            </a:r>
-            <a:r>
-              <a:rPr lang="de-DE" dirty="0" err="1"/>
-              <a:t>room</a:t>
-            </a:r>
-            <a:r>
-              <a:rPr lang="de-DE" dirty="0"/>
-              <a:t> </a:t>
-            </a:r>
-            <a:r>
-              <a:rPr lang="de-DE" dirty="0" err="1"/>
-              <a:t>micro</a:t>
-            </a:r>
-            <a:r>
-              <a:rPr lang="de-DE" dirty="0"/>
-              <a:t> </a:t>
-            </a:r>
-            <a:r>
-              <a:rPr lang="de-DE" dirty="0" err="1"/>
-              <a:t>from</a:t>
-            </a:r>
-            <a:r>
-              <a:rPr lang="de-DE" dirty="0"/>
-              <a:t> </a:t>
-            </a:r>
-            <a:r>
-              <a:rPr lang="de-DE" dirty="0" err="1"/>
-              <a:t>amplifier</a:t>
-            </a:r>
-            <a:r>
-              <a:rPr lang="de-DE" dirty="0"/>
-              <a:t>)</a:t>
+              <a:rPr lang="de-DE" dirty="0" err="1"/>
+              <a:t>Beamer</a:t>
+            </a:r>
+            <a:r>
+              <a:rPr lang="de-DE" dirty="0"/>
+              <a:t> Livestream -  View</a:t>
             </a:r>
           </a:p>
         </p:txBody>
@@ -6674,20 +5780,18 @@
           </a:xfrm>
         </p:spPr>
         <p:txBody>
-          <a:bodyPr/>
-          <a:lstStyle/>
-          <a:p>
-            <a:r>
-              <a:rPr lang="de-DE" dirty="0" err="1"/>
-              <a:t>Audiochannel</a:t>
-            </a:r>
-            <a:r>
-              <a:rPr lang="de-DE" dirty="0"/>
-              <a:t> 3 (</a:t>
-            </a:r>
-            <a:r>
-              <a:rPr lang="de-DE" dirty="0" err="1"/>
-              <a:t>room</a:t>
+          <a:bodyPr>
+            <a:normAutofit lnSpcReduction="10000"/>
+          </a:bodyPr>
+          <a:lstStyle/>
+          <a:p>
+            <a:r>
+              <a:rPr lang="de-DE" dirty="0"/>
+              <a:t>Switch </a:t>
+            </a:r>
+            <a:r>
+              <a:rPr lang="de-DE" dirty="0" err="1"/>
+              <a:t>beamer</a:t>
             </a:r>
             <a:r>
               <a:rPr lang="de-DE" dirty="0"/>
@@ -6695,27 +5799,23 @@
             </a:r>
             <a:r>
               <a:rPr lang="de-DE" dirty="0" err="1"/>
-              <a:t>microphone</a:t>
-            </a:r>
-            <a:r>
-              <a:rPr lang="de-DE" dirty="0"/>
-              <a:t>) fade </a:t>
-            </a:r>
-            <a:r>
-              <a:rPr lang="de-DE" dirty="0" err="1"/>
-              <a:t>up</a:t>
-            </a:r>
-            <a:endParaRPr lang="de-DE" dirty="0"/>
-          </a:p>
-          <a:p>
-            <a:r>
-              <a:rPr lang="de-DE" dirty="0" err="1"/>
-              <a:t>Audiochannel</a:t>
-            </a:r>
-            <a:r>
-              <a:rPr lang="de-DE" dirty="0"/>
-              <a:t> 1,2,4 fade down</a:t>
-            </a:r>
+              <a:t>to</a:t>
+            </a:r>
+            <a:r>
+              <a:rPr lang="de-DE" dirty="0"/>
+              <a:t> HDMI 2 (Livestream -  </a:t>
+            </a:r>
+            <a:r>
+              <a:rPr lang="de-DE" dirty="0" err="1"/>
+              <a:t>view</a:t>
+            </a:r>
+            <a:r>
+              <a:rPr lang="de-DE" dirty="0"/>
+              <a:t>)</a:t>
+            </a:r>
+          </a:p>
+          <a:p>
+            <a:endParaRPr lang="de-DE" dirty="0"/>
           </a:p>
           <a:p>
             <a:endParaRPr lang="de-DE" dirty="0"/>
@@ -6736,7 +5836,7 @@
                   <a:srgbClr val="FF0000"/>
                 </a:solidFill>
               </a:rPr>
-              <a:t>                                                                          A3</a:t>
+              <a:t>                                                                         BS</a:t>
             </a:r>
             <a:endParaRPr lang="de-DE" dirty="0"/>
           </a:p>
@@ -6750,26 +5850,24 @@
             <a:pPr marL="0" indent="0">
               <a:buNone/>
             </a:pPr>
-            <a:r>
-              <a:rPr lang="de-DE" dirty="0"/>
-              <a:t>JokiAutomation.exe "</a:t>
-            </a:r>
-            <a:r>
-              <a:rPr lang="de-DE" dirty="0" err="1"/>
-              <a:t>Audio_RaumMikro</a:t>
-            </a:r>
-            <a:r>
-              <a:rPr lang="de-DE" dirty="0"/>
+            <a:endParaRPr lang="de-DE" dirty="0"/>
+          </a:p>
+          <a:p>
+            <a:pPr marL="0" indent="0">
+              <a:buNone/>
+            </a:pPr>
+            <a:r>
+              <a:rPr lang="fr-FR" dirty="0"/>
+              <a:t>JokiAutomation.exe  "</a:t>
+            </a:r>
+            <a:r>
+              <a:rPr lang="fr-FR" dirty="0" err="1"/>
+              <a:t>BEAMER_LiveStream</a:t>
+            </a:r>
+            <a:r>
+              <a:rPr lang="fr-FR" dirty="0"/>
               <a:t>"</a:t>
             </a:r>
-          </a:p>
-          <a:p>
-            <a:pPr marL="0" indent="0">
-              <a:buNone/>
-            </a:pPr>
-            <a:endParaRPr lang="de-DE" dirty="0"/>
-          </a:p>
-          <a:p>
             <a:endParaRPr lang="de-DE" dirty="0"/>
           </a:p>
         </p:txBody>
@@ -6816,15 +5914,44 @@
           <a:bodyPr rtlCol="0" anchor="ctr"/>
           <a:lstStyle/>
           <a:p>
-            <a:pPr algn="ctr"/>
-            <a:endParaRPr lang="de-DE"/>
+            <a:pPr marL="0" marR="0" lvl="0" indent="0" algn="ctr" defTabSz="457200" rtl="0" eaLnBrk="1" fontAlgn="auto" latinLnBrk="0" hangingPunct="1">
+              <a:lnSpc>
+                <a:spcPct val="100000"/>
+              </a:lnSpc>
+              <a:spcBef>
+                <a:spcPts val="0"/>
+              </a:spcBef>
+              <a:spcAft>
+                <a:spcPts val="0"/>
+              </a:spcAft>
+              <a:buClrTx/>
+              <a:buSzTx/>
+              <a:buFontTx/>
+              <a:buNone/>
+              <a:tabLst/>
+              <a:defRPr/>
+            </a:pPr>
+            <a:endParaRPr kumimoji="0" lang="de-DE" sz="1800" b="0" i="0" u="none" strike="noStrike" kern="1200" cap="none" spc="0" normalizeH="0" baseline="0" noProof="0" dirty="0">
+              <a:ln>
+                <a:noFill/>
+              </a:ln>
+              <a:solidFill>
+                <a:prstClr val="white"/>
+              </a:solidFill>
+              <a:effectLst/>
+              <a:uLnTx/>
+              <a:uFillTx/>
+              <a:latin typeface="Calibri"/>
+              <a:ea typeface="+mn-ea"/>
+              <a:cs typeface="+mn-cs"/>
+            </a:endParaRPr>
           </a:p>
         </p:txBody>
       </p:sp>
     </p:spTree>
     <p:extLst>
       <p:ext uri="{BB962C8B-B14F-4D97-AF65-F5344CB8AC3E}">
-        <p14:creationId xmlns:p14="http://schemas.microsoft.com/office/powerpoint/2010/main" val="712906444"/>
+        <p14:creationId xmlns:p14="http://schemas.microsoft.com/office/powerpoint/2010/main" val="2139964971"/>
       </p:ext>
     </p:extLst>
   </p:cSld>

</xml_diff>

<commit_message>
new sequences mute beamer and stopp backuprecorder
</commit_message>
<xml_diff>
--- a/docu/JoKiAutomationTemplate.pptx
+++ b/docu/JoKiAutomationTemplate.pptx
@@ -16,7 +16,8 @@
     <p:sldId id="271" r:id="rId10"/>
     <p:sldId id="270" r:id="rId11"/>
     <p:sldId id="273" r:id="rId12"/>
-    <p:sldId id="272" r:id="rId13"/>
+    <p:sldId id="274" r:id="rId13"/>
+    <p:sldId id="272" r:id="rId14"/>
   </p:sldIdLst>
   <p:sldSz cx="12192000" cy="6858000"/>
   <p:notesSz cx="6858000" cy="9144000"/>
@@ -266,7 +267,7 @@
             <a:fld id="{601D6D48-1CD0-4D69-8E45-8FD8C1E00D98}" type="datetimeFigureOut">
               <a:rPr lang="de-DE" smtClean="0"/>
               <a:pPr/>
-              <a:t>15.12.2020</a:t>
+              <a:t>16.12.2020</a:t>
             </a:fld>
             <a:endParaRPr lang="de-DE"/>
           </a:p>
@@ -438,7 +439,7 @@
             <a:fld id="{601D6D48-1CD0-4D69-8E45-8FD8C1E00D98}" type="datetimeFigureOut">
               <a:rPr lang="de-DE" smtClean="0"/>
               <a:pPr/>
-              <a:t>15.12.2020</a:t>
+              <a:t>16.12.2020</a:t>
             </a:fld>
             <a:endParaRPr lang="de-DE"/>
           </a:p>
@@ -620,7 +621,7 @@
             <a:fld id="{601D6D48-1CD0-4D69-8E45-8FD8C1E00D98}" type="datetimeFigureOut">
               <a:rPr lang="de-DE" smtClean="0"/>
               <a:pPr/>
-              <a:t>15.12.2020</a:t>
+              <a:t>16.12.2020</a:t>
             </a:fld>
             <a:endParaRPr lang="de-DE"/>
           </a:p>
@@ -792,7 +793,7 @@
             <a:fld id="{601D6D48-1CD0-4D69-8E45-8FD8C1E00D98}" type="datetimeFigureOut">
               <a:rPr lang="de-DE" smtClean="0"/>
               <a:pPr/>
-              <a:t>15.12.2020</a:t>
+              <a:t>16.12.2020</a:t>
             </a:fld>
             <a:endParaRPr lang="de-DE"/>
           </a:p>
@@ -1040,7 +1041,7 @@
             <a:fld id="{601D6D48-1CD0-4D69-8E45-8FD8C1E00D98}" type="datetimeFigureOut">
               <a:rPr lang="de-DE" smtClean="0"/>
               <a:pPr/>
-              <a:t>15.12.2020</a:t>
+              <a:t>16.12.2020</a:t>
             </a:fld>
             <a:endParaRPr lang="de-DE"/>
           </a:p>
@@ -1274,7 +1275,7 @@
             <a:fld id="{601D6D48-1CD0-4D69-8E45-8FD8C1E00D98}" type="datetimeFigureOut">
               <a:rPr lang="de-DE" smtClean="0"/>
               <a:pPr/>
-              <a:t>15.12.2020</a:t>
+              <a:t>16.12.2020</a:t>
             </a:fld>
             <a:endParaRPr lang="de-DE"/>
           </a:p>
@@ -1643,7 +1644,7 @@
             <a:fld id="{601D6D48-1CD0-4D69-8E45-8FD8C1E00D98}" type="datetimeFigureOut">
               <a:rPr lang="de-DE" smtClean="0"/>
               <a:pPr/>
-              <a:t>15.12.2020</a:t>
+              <a:t>16.12.2020</a:t>
             </a:fld>
             <a:endParaRPr lang="de-DE"/>
           </a:p>
@@ -1763,7 +1764,7 @@
             <a:fld id="{601D6D48-1CD0-4D69-8E45-8FD8C1E00D98}" type="datetimeFigureOut">
               <a:rPr lang="de-DE" smtClean="0"/>
               <a:pPr/>
-              <a:t>15.12.2020</a:t>
+              <a:t>16.12.2020</a:t>
             </a:fld>
             <a:endParaRPr lang="de-DE"/>
           </a:p>
@@ -1860,7 +1861,7 @@
             <a:fld id="{601D6D48-1CD0-4D69-8E45-8FD8C1E00D98}" type="datetimeFigureOut">
               <a:rPr lang="de-DE" smtClean="0"/>
               <a:pPr/>
-              <a:t>15.12.2020</a:t>
+              <a:t>16.12.2020</a:t>
             </a:fld>
             <a:endParaRPr lang="de-DE"/>
           </a:p>
@@ -2139,7 +2140,7 @@
             <a:fld id="{601D6D48-1CD0-4D69-8E45-8FD8C1E00D98}" type="datetimeFigureOut">
               <a:rPr lang="de-DE" smtClean="0"/>
               <a:pPr/>
-              <a:t>15.12.2020</a:t>
+              <a:t>16.12.2020</a:t>
             </a:fld>
             <a:endParaRPr lang="de-DE"/>
           </a:p>
@@ -2398,7 +2399,7 @@
             <a:fld id="{601D6D48-1CD0-4D69-8E45-8FD8C1E00D98}" type="datetimeFigureOut">
               <a:rPr lang="de-DE" smtClean="0"/>
               <a:pPr/>
-              <a:t>15.12.2020</a:t>
+              <a:t>16.12.2020</a:t>
             </a:fld>
             <a:endParaRPr lang="de-DE"/>
           </a:p>
@@ -2613,7 +2614,7 @@
             <a:fld id="{601D6D48-1CD0-4D69-8E45-8FD8C1E00D98}" type="datetimeFigureOut">
               <a:rPr lang="de-DE" smtClean="0"/>
               <a:pPr/>
-              <a:t>15.12.2020</a:t>
+              <a:t>16.12.2020</a:t>
             </a:fld>
             <a:endParaRPr lang="de-DE"/>
           </a:p>
@@ -3832,6 +3833,255 @@
           <a:lstStyle/>
           <a:p>
             <a:r>
+              <a:rPr lang="de-DE" dirty="0"/>
+              <a:t>Backup – Recorder </a:t>
+            </a:r>
+            <a:r>
+              <a:rPr lang="de-DE" dirty="0" err="1"/>
+              <a:t>Stop</a:t>
+            </a:r>
+            <a:endParaRPr lang="de-DE" dirty="0"/>
+          </a:p>
+        </p:txBody>
+      </p:sp>
+      <p:sp>
+        <p:nvSpPr>
+          <p:cNvPr id="3" name="Inhaltsplatzhalter 2">
+            <a:extLst>
+              <a:ext uri="{FF2B5EF4-FFF2-40B4-BE49-F238E27FC236}">
+                <a16:creationId xmlns:a16="http://schemas.microsoft.com/office/drawing/2014/main" id="{E47621BA-2F32-4AB0-8C4C-5362CB4F4EC5}"/>
+              </a:ext>
+            </a:extLst>
+          </p:cNvPr>
+          <p:cNvSpPr>
+            <a:spLocks noGrp="1"/>
+          </p:cNvSpPr>
+          <p:nvPr>
+            <p:ph idx="1"/>
+          </p:nvPr>
+        </p:nvSpPr>
+        <p:spPr>
+          <a:xfrm>
+            <a:off x="838200" y="1807751"/>
+            <a:ext cx="10515600" cy="4351338"/>
+          </a:xfrm>
+        </p:spPr>
+        <p:txBody>
+          <a:bodyPr>
+            <a:normAutofit/>
+          </a:bodyPr>
+          <a:lstStyle/>
+          <a:p>
+            <a:r>
+              <a:rPr lang="de-DE"/>
+              <a:t>stopps</a:t>
+            </a:r>
+            <a:r>
+              <a:rPr lang="de-DE" dirty="0"/>
+              <a:t> </a:t>
+            </a:r>
+            <a:r>
+              <a:rPr lang="de-DE" dirty="0" err="1"/>
+              <a:t>the</a:t>
+            </a:r>
+            <a:r>
+              <a:rPr lang="de-DE" dirty="0"/>
+              <a:t> </a:t>
+            </a:r>
+            <a:r>
+              <a:rPr lang="de-DE" dirty="0" err="1"/>
+              <a:t>backup</a:t>
+            </a:r>
+            <a:r>
+              <a:rPr lang="de-DE" dirty="0"/>
+              <a:t> </a:t>
+            </a:r>
+            <a:r>
+              <a:rPr lang="de-DE" dirty="0" err="1"/>
+              <a:t>recorder</a:t>
+            </a:r>
+            <a:endParaRPr lang="de-DE" dirty="0"/>
+          </a:p>
+          <a:p>
+            <a:endParaRPr lang="de-DE" dirty="0"/>
+          </a:p>
+          <a:p>
+            <a:endParaRPr lang="de-DE" dirty="0"/>
+          </a:p>
+          <a:p>
+            <a:endParaRPr lang="de-DE" dirty="0"/>
+          </a:p>
+          <a:p>
+            <a:endParaRPr lang="de-DE" dirty="0"/>
+          </a:p>
+          <a:p>
+            <a:pPr marL="0" indent="0">
+              <a:buNone/>
+            </a:pPr>
+            <a:r>
+              <a:rPr lang="de-DE" dirty="0">
+                <a:solidFill>
+                  <a:srgbClr val="FF0000"/>
+                </a:solidFill>
+              </a:rPr>
+              <a:t>                                                                         RS</a:t>
+            </a:r>
+            <a:endParaRPr lang="de-DE" dirty="0"/>
+          </a:p>
+          <a:p>
+            <a:pPr marL="0" indent="0">
+              <a:buNone/>
+            </a:pPr>
+            <a:endParaRPr lang="de-DE" dirty="0"/>
+          </a:p>
+          <a:p>
+            <a:pPr marL="0" indent="0">
+              <a:buNone/>
+            </a:pPr>
+            <a:r>
+              <a:rPr lang="fr-FR" dirty="0"/>
+              <a:t>JokiAutomation.exe "</a:t>
+            </a:r>
+            <a:r>
+              <a:rPr lang="fr-FR" dirty="0" err="1"/>
+              <a:t>Backup_Stop</a:t>
+            </a:r>
+            <a:r>
+              <a:rPr lang="fr-FR" dirty="0"/>
+              <a:t>"</a:t>
+            </a:r>
+            <a:endParaRPr lang="de-DE" dirty="0"/>
+          </a:p>
+        </p:txBody>
+      </p:sp>
+      <p:sp>
+        <p:nvSpPr>
+          <p:cNvPr id="4" name="Pfeil: nach rechts 3">
+            <a:hlinkClick r:id="rId2" action="ppaction://program"/>
+            <a:extLst>
+              <a:ext uri="{FF2B5EF4-FFF2-40B4-BE49-F238E27FC236}">
+                <a16:creationId xmlns:a16="http://schemas.microsoft.com/office/drawing/2014/main" id="{5D07DC50-91BF-4A42-B5AF-0D3DC4A229F5}"/>
+              </a:ext>
+            </a:extLst>
+          </p:cNvPr>
+          <p:cNvSpPr/>
+          <p:nvPr/>
+        </p:nvSpPr>
+        <p:spPr>
+          <a:xfrm>
+            <a:off x="5307724" y="3983420"/>
+            <a:ext cx="1492469" cy="693683"/>
+          </a:xfrm>
+          <a:prstGeom prst="rightArrow">
+            <a:avLst/>
+          </a:prstGeom>
+        </p:spPr>
+        <p:style>
+          <a:lnRef idx="2">
+            <a:schemeClr val="accent1">
+              <a:shade val="50000"/>
+            </a:schemeClr>
+          </a:lnRef>
+          <a:fillRef idx="1">
+            <a:schemeClr val="accent1"/>
+          </a:fillRef>
+          <a:effectRef idx="0">
+            <a:schemeClr val="accent1"/>
+          </a:effectRef>
+          <a:fontRef idx="minor">
+            <a:schemeClr val="lt1"/>
+          </a:fontRef>
+        </p:style>
+        <p:txBody>
+          <a:bodyPr rtlCol="0" anchor="ctr"/>
+          <a:lstStyle/>
+          <a:p>
+            <a:pPr marL="0" marR="0" lvl="0" indent="0" algn="ctr" defTabSz="457200" rtl="0" eaLnBrk="1" fontAlgn="auto" latinLnBrk="0" hangingPunct="1">
+              <a:lnSpc>
+                <a:spcPct val="100000"/>
+              </a:lnSpc>
+              <a:spcBef>
+                <a:spcPts val="0"/>
+              </a:spcBef>
+              <a:spcAft>
+                <a:spcPts val="0"/>
+              </a:spcAft>
+              <a:buClrTx/>
+              <a:buSzTx/>
+              <a:buFontTx/>
+              <a:buNone/>
+              <a:tabLst/>
+              <a:defRPr/>
+            </a:pPr>
+            <a:endParaRPr kumimoji="0" lang="de-DE" sz="1800" b="0" i="0" u="none" strike="noStrike" kern="1200" cap="none" spc="0" normalizeH="0" baseline="0" noProof="0" dirty="0">
+              <a:ln>
+                <a:noFill/>
+              </a:ln>
+              <a:solidFill>
+                <a:prstClr val="white"/>
+              </a:solidFill>
+              <a:effectLst/>
+              <a:uLnTx/>
+              <a:uFillTx/>
+              <a:latin typeface="Calibri"/>
+              <a:ea typeface="+mn-ea"/>
+              <a:cs typeface="+mn-cs"/>
+            </a:endParaRPr>
+          </a:p>
+        </p:txBody>
+      </p:sp>
+    </p:spTree>
+    <p:extLst>
+      <p:ext uri="{BB962C8B-B14F-4D97-AF65-F5344CB8AC3E}">
+        <p14:creationId xmlns:p14="http://schemas.microsoft.com/office/powerpoint/2010/main" val="3972719392"/>
+      </p:ext>
+    </p:extLst>
+  </p:cSld>
+  <p:clrMapOvr>
+    <a:masterClrMapping/>
+  </p:clrMapOvr>
+</p:sld>
+</file>
+
+<file path=ppt/slides/slide13.xml><?xml version="1.0" encoding="utf-8"?>
+<p:sld xmlns:a="http://schemas.openxmlformats.org/drawingml/2006/main" xmlns:r="http://schemas.openxmlformats.org/officeDocument/2006/relationships" xmlns:p="http://schemas.openxmlformats.org/presentationml/2006/main">
+  <p:cSld>
+    <p:spTree>
+      <p:nvGrpSpPr>
+        <p:cNvPr id="1" name=""/>
+        <p:cNvGrpSpPr/>
+        <p:nvPr/>
+      </p:nvGrpSpPr>
+      <p:grpSpPr>
+        <a:xfrm>
+          <a:off x="0" y="0"/>
+          <a:ext cx="0" cy="0"/>
+          <a:chOff x="0" y="0"/>
+          <a:chExt cx="0" cy="0"/>
+        </a:xfrm>
+      </p:grpSpPr>
+      <p:sp>
+        <p:nvSpPr>
+          <p:cNvPr id="2" name="Titel 1">
+            <a:extLst>
+              <a:ext uri="{FF2B5EF4-FFF2-40B4-BE49-F238E27FC236}">
+                <a16:creationId xmlns:a16="http://schemas.microsoft.com/office/drawing/2014/main" id="{19DD5F15-9C27-4730-80B4-4B8CA5C3D954}"/>
+              </a:ext>
+            </a:extLst>
+          </p:cNvPr>
+          <p:cNvSpPr>
+            <a:spLocks noGrp="1"/>
+          </p:cNvSpPr>
+          <p:nvPr>
+            <p:ph type="title"/>
+          </p:nvPr>
+        </p:nvSpPr>
+        <p:spPr/>
+        <p:txBody>
+          <a:bodyPr/>
+          <a:lstStyle/>
+          <a:p>
+            <a:r>
               <a:rPr lang="de-DE" dirty="0" err="1"/>
               <a:t>shut</a:t>
             </a:r>

</xml_diff>